<commit_message>
lil change in pptx
</commit_message>
<xml_diff>
--- a/media/OKTODO_1ER AVANCE.pptx
+++ b/media/OKTODO_1ER AVANCE.pptx
@@ -286,6 +286,11 @@
             <a:srgbClr val="9AA0A6"/>
           </p15:clr>
         </p15:guide>
+        <p15:guide id="2" pos="2880">
+          <p15:clr>
+            <a:srgbClr val="A4A3A4"/>
+          </p15:clr>
+        </p15:guide>
       </p15:sldGuideLst>
     </p:ext>
   </p:extLst>
@@ -364,6 +369,13 @@
             <a:tailEnd type="none" w="sm" len="sm"/>
           </a:ln>
         </p:spPr>
+        <p:txBody>
+          <a:bodyPr/>
+          <a:lstStyle/>
+          <a:p>
+            <a:endParaRPr lang="es-MX"/>
+          </a:p>
+        </p:txBody>
       </p:sp>
       <p:sp>
         <p:nvSpPr>
@@ -790,6 +802,13 @@
             </a:pathLst>
           </a:custGeom>
         </p:spPr>
+        <p:txBody>
+          <a:bodyPr/>
+          <a:lstStyle/>
+          <a:p>
+            <a:endParaRPr lang="es-MX"/>
+          </a:p>
+        </p:txBody>
       </p:sp>
       <p:sp>
         <p:nvSpPr>
@@ -894,6 +913,13 @@
             </a:pathLst>
           </a:custGeom>
         </p:spPr>
+        <p:txBody>
+          <a:bodyPr/>
+          <a:lstStyle/>
+          <a:p>
+            <a:endParaRPr lang="es-MX"/>
+          </a:p>
+        </p:txBody>
       </p:sp>
       <p:sp>
         <p:nvSpPr>
@@ -1010,6 +1036,13 @@
             </a:pathLst>
           </a:custGeom>
         </p:spPr>
+        <p:txBody>
+          <a:bodyPr/>
+          <a:lstStyle/>
+          <a:p>
+            <a:endParaRPr lang="es-MX"/>
+          </a:p>
+        </p:txBody>
       </p:sp>
       <p:sp>
         <p:nvSpPr>
@@ -1125,6 +1158,13 @@
             </a:pathLst>
           </a:custGeom>
         </p:spPr>
+        <p:txBody>
+          <a:bodyPr/>
+          <a:lstStyle/>
+          <a:p>
+            <a:endParaRPr lang="es-MX"/>
+          </a:p>
+        </p:txBody>
       </p:sp>
       <p:sp>
         <p:nvSpPr>
@@ -1229,6 +1269,13 @@
             </a:pathLst>
           </a:custGeom>
         </p:spPr>
+        <p:txBody>
+          <a:bodyPr/>
+          <a:lstStyle/>
+          <a:p>
+            <a:endParaRPr lang="es-MX"/>
+          </a:p>
+        </p:txBody>
       </p:sp>
       <p:sp>
         <p:nvSpPr>
@@ -1333,6 +1380,13 @@
             </a:pathLst>
           </a:custGeom>
         </p:spPr>
+        <p:txBody>
+          <a:bodyPr/>
+          <a:lstStyle/>
+          <a:p>
+            <a:endParaRPr lang="es-MX"/>
+          </a:p>
+        </p:txBody>
       </p:sp>
       <p:sp>
         <p:nvSpPr>
@@ -1437,6 +1491,13 @@
             </a:pathLst>
           </a:custGeom>
         </p:spPr>
+        <p:txBody>
+          <a:bodyPr/>
+          <a:lstStyle/>
+          <a:p>
+            <a:endParaRPr lang="es-MX"/>
+          </a:p>
+        </p:txBody>
       </p:sp>
       <p:sp>
         <p:nvSpPr>
@@ -1541,6 +1602,13 @@
             </a:pathLst>
           </a:custGeom>
         </p:spPr>
+        <p:txBody>
+          <a:bodyPr/>
+          <a:lstStyle/>
+          <a:p>
+            <a:endParaRPr lang="es-MX"/>
+          </a:p>
+        </p:txBody>
       </p:sp>
       <p:sp>
         <p:nvSpPr>
@@ -1645,6 +1713,13 @@
             </a:pathLst>
           </a:custGeom>
         </p:spPr>
+        <p:txBody>
+          <a:bodyPr/>
+          <a:lstStyle/>
+          <a:p>
+            <a:endParaRPr lang="es-MX"/>
+          </a:p>
+        </p:txBody>
       </p:sp>
       <p:sp>
         <p:nvSpPr>
@@ -1749,6 +1824,13 @@
             </a:pathLst>
           </a:custGeom>
         </p:spPr>
+        <p:txBody>
+          <a:bodyPr/>
+          <a:lstStyle/>
+          <a:p>
+            <a:endParaRPr lang="es-MX"/>
+          </a:p>
+        </p:txBody>
       </p:sp>
       <p:sp>
         <p:nvSpPr>
@@ -1853,6 +1935,13 @@
             </a:pathLst>
           </a:custGeom>
         </p:spPr>
+        <p:txBody>
+          <a:bodyPr/>
+          <a:lstStyle/>
+          <a:p>
+            <a:endParaRPr lang="es-MX"/>
+          </a:p>
+        </p:txBody>
       </p:sp>
       <p:sp>
         <p:nvSpPr>
@@ -1957,6 +2046,13 @@
             </a:pathLst>
           </a:custGeom>
         </p:spPr>
+        <p:txBody>
+          <a:bodyPr/>
+          <a:lstStyle/>
+          <a:p>
+            <a:endParaRPr lang="es-MX"/>
+          </a:p>
+        </p:txBody>
       </p:sp>
       <p:sp>
         <p:nvSpPr>
@@ -28018,7 +28114,7 @@
         </p:blipFill>
         <p:spPr>
           <a:xfrm>
-            <a:off x="309517" y="75983"/>
+            <a:off x="1173875" y="75983"/>
             <a:ext cx="2651990" cy="4991533"/>
           </a:xfrm>
           <a:prstGeom prst="rect">
@@ -28042,8 +28138,8 @@
         </p:nvSpPr>
         <p:spPr>
           <a:xfrm>
-            <a:off x="4645403" y="1337007"/>
-            <a:ext cx="2756292" cy="2124000"/>
+            <a:off x="4712967" y="1368851"/>
+            <a:ext cx="2756292" cy="2866503"/>
           </a:xfrm>
           <a:prstGeom prst="rect">
             <a:avLst/>
@@ -28291,23 +28387,128 @@
                 </a:solidFill>
                 <a:latin typeface="Karla Medium" pitchFamily="2" charset="0"/>
               </a:rPr>
-              <a:t>Aquí estará la forma de interacción de nuestra app, donde creara grupos con sus amigos, y en esos grupos poder crear eventos en conjunto, lo único a posibles cambios en este apartado aparte de los ya mencionados seria la vista de eventos compartidos a un calendario como el de </a:t>
+              <a:t>Aquí estará la forma de</a:t>
             </a:r>
+          </a:p>
+          <a:p>
+            <a:pPr marL="285750" indent="-285750" algn="ctr"/>
             <a:r>
-              <a:rPr lang="es-MX" dirty="0" err="1">
+              <a:rPr lang="es-MX" dirty="0">
                 <a:solidFill>
                   <a:schemeClr val="tx1"/>
                 </a:solidFill>
                 <a:latin typeface="Karla Medium" pitchFamily="2" charset="0"/>
               </a:rPr>
-              <a:t>samsung</a:t>
+              <a:t>interacción de nuestra app,</a:t>
             </a:r>
-            <a:endParaRPr lang="es-MX" dirty="0">
-              <a:solidFill>
-                <a:schemeClr val="tx1"/>
-              </a:solidFill>
-              <a:latin typeface="Karla Medium" pitchFamily="2" charset="0"/>
-            </a:endParaRPr>
+          </a:p>
+          <a:p>
+            <a:pPr marL="285750" indent="-285750" algn="ctr"/>
+            <a:r>
+              <a:rPr lang="es-MX" dirty="0">
+                <a:solidFill>
+                  <a:schemeClr val="tx1"/>
+                </a:solidFill>
+                <a:latin typeface="Karla Medium" pitchFamily="2" charset="0"/>
+              </a:rPr>
+              <a:t>donde creara grupos con sus </a:t>
+            </a:r>
+          </a:p>
+          <a:p>
+            <a:pPr marL="285750" indent="-285750" algn="ctr"/>
+            <a:r>
+              <a:rPr lang="es-MX" dirty="0">
+                <a:solidFill>
+                  <a:schemeClr val="tx1"/>
+                </a:solidFill>
+                <a:latin typeface="Karla Medium" pitchFamily="2" charset="0"/>
+              </a:rPr>
+              <a:t>amigos, y en esos grupos </a:t>
+            </a:r>
+          </a:p>
+          <a:p>
+            <a:pPr marL="285750" indent="-285750" algn="ctr"/>
+            <a:r>
+              <a:rPr lang="es-MX" dirty="0">
+                <a:solidFill>
+                  <a:schemeClr val="tx1"/>
+                </a:solidFill>
+                <a:latin typeface="Karla Medium" pitchFamily="2" charset="0"/>
+              </a:rPr>
+              <a:t>poder crear eventos en </a:t>
+            </a:r>
+          </a:p>
+          <a:p>
+            <a:pPr marL="285750" indent="-285750" algn="ctr"/>
+            <a:r>
+              <a:rPr lang="es-MX" dirty="0">
+                <a:solidFill>
+                  <a:schemeClr val="tx1"/>
+                </a:solidFill>
+                <a:latin typeface="Karla Medium" pitchFamily="2" charset="0"/>
+              </a:rPr>
+              <a:t>conjunto, lo único a posibles </a:t>
+            </a:r>
+          </a:p>
+          <a:p>
+            <a:pPr marL="285750" indent="-285750" algn="ctr"/>
+            <a:r>
+              <a:rPr lang="es-MX" dirty="0">
+                <a:solidFill>
+                  <a:schemeClr val="tx1"/>
+                </a:solidFill>
+                <a:latin typeface="Karla Medium" pitchFamily="2" charset="0"/>
+              </a:rPr>
+              <a:t>cambios en este apartado </a:t>
+            </a:r>
+          </a:p>
+          <a:p>
+            <a:pPr marL="285750" indent="-285750" algn="ctr"/>
+            <a:r>
+              <a:rPr lang="es-MX" dirty="0">
+                <a:solidFill>
+                  <a:schemeClr val="tx1"/>
+                </a:solidFill>
+                <a:latin typeface="Karla Medium" pitchFamily="2" charset="0"/>
+              </a:rPr>
+              <a:t>aparte de los ya mencionados </a:t>
+            </a:r>
+          </a:p>
+          <a:p>
+            <a:pPr marL="285750" indent="-285750" algn="ctr"/>
+            <a:r>
+              <a:rPr lang="es-MX" dirty="0">
+                <a:solidFill>
+                  <a:schemeClr val="tx1"/>
+                </a:solidFill>
+                <a:latin typeface="Karla Medium" pitchFamily="2" charset="0"/>
+              </a:rPr>
+              <a:t>seria la vista de eventos </a:t>
+            </a:r>
+          </a:p>
+          <a:p>
+            <a:pPr marL="285750" indent="-285750" algn="ctr"/>
+            <a:r>
+              <a:rPr lang="es-MX" dirty="0">
+                <a:solidFill>
+                  <a:schemeClr val="tx1"/>
+                </a:solidFill>
+                <a:latin typeface="Karla Medium" pitchFamily="2" charset="0"/>
+              </a:rPr>
+              <a:t>compartidos a un calendario </a:t>
+            </a:r>
+          </a:p>
+          <a:p>
+            <a:pPr marL="285750" indent="-285750" algn="ctr"/>
+            <a:r>
+              <a:rPr lang="es-MX" dirty="0">
+                <a:solidFill>
+                  <a:schemeClr val="tx1"/>
+                </a:solidFill>
+                <a:latin typeface="Karla Medium" pitchFamily="2" charset="0"/>
+              </a:rPr>
+              <a:t>como el de Samsung</a:t>
+            </a:r>
           </a:p>
         </p:txBody>
       </p:sp>
@@ -28396,8 +28597,8 @@
         </p:nvSpPr>
         <p:spPr>
           <a:xfrm>
-            <a:off x="5708486" y="1225495"/>
-            <a:ext cx="2756292" cy="2124000"/>
+            <a:off x="5708486" y="1225494"/>
+            <a:ext cx="2756292" cy="2868833"/>
           </a:xfrm>
           <a:prstGeom prst="rect">
             <a:avLst/>
@@ -28637,7 +28838,7 @@
             </a:lvl9pPr>
           </a:lstStyle>
           <a:p>
-            <a:pPr marL="285750" indent="-285750" algn="ctr"/>
+            <a:pPr marL="285750" indent="-285750" algn="r"/>
             <a:r>
               <a:rPr lang="es-MX" dirty="0">
                 <a:solidFill>
@@ -28645,16 +28846,28 @@
                 </a:solidFill>
                 <a:latin typeface="Karla Medium" pitchFamily="2" charset="0"/>
               </a:rPr>
-              <a:t>En perfil encontrara el usuario su información, agregaremos una forma de cambiar su foto y nombre pero aquí será donde el usuario podrá comprar diferentes aspectos para </a:t>
+              <a:t>En la sección de perfil el </a:t>
             </a:r>
+          </a:p>
+          <a:p>
+            <a:pPr marL="285750" indent="-285750" algn="r"/>
             <a:r>
-              <a:rPr lang="es-MX" dirty="0" err="1">
+              <a:rPr lang="es-MX" dirty="0">
                 <a:solidFill>
                   <a:schemeClr val="tx1"/>
                 </a:solidFill>
                 <a:latin typeface="Karla Medium" pitchFamily="2" charset="0"/>
               </a:rPr>
-              <a:t>okto</a:t>
+              <a:t>usuario encontrara su información, agregaremos una forma de cambiar su foto y nombre pero aquí será donde el usuario podrá comprar diferentes aspectos para </a:t>
+            </a:r>
+            <a:r>
+              <a:rPr lang="es-MX" b="1" dirty="0">
+                <a:solidFill>
+                  <a:schemeClr val="tx1"/>
+                </a:solidFill>
+                <a:latin typeface="Karla Medium" pitchFamily="2" charset="0"/>
+              </a:rPr>
+              <a:t>Okto</a:t>
             </a:r>
             <a:r>
               <a:rPr lang="es-MX" dirty="0">
@@ -28768,12 +28981,12 @@
         </p:nvCxnSpPr>
         <p:spPr>
           <a:xfrm rot="5400000">
-            <a:off x="4188756" y="3500689"/>
-            <a:ext cx="562781" cy="272941"/>
+            <a:off x="4290608" y="3618962"/>
+            <a:ext cx="556432" cy="6351"/>
           </a:xfrm>
           <a:prstGeom prst="bentConnector3">
             <a:avLst>
-              <a:gd name="adj1" fmla="val 98876"/>
+              <a:gd name="adj1" fmla="val 99872"/>
             </a:avLst>
           </a:prstGeom>
           <a:noFill/>
@@ -28796,9 +29009,9 @@
         </p:nvGrpSpPr>
         <p:grpSpPr>
           <a:xfrm>
-            <a:off x="3315287" y="3918550"/>
+            <a:off x="3451756" y="3918550"/>
             <a:ext cx="2309721" cy="620400"/>
-            <a:chOff x="716850" y="1864738"/>
+            <a:chOff x="817335" y="1864738"/>
             <a:chExt cx="1700700" cy="620400"/>
           </a:xfrm>
         </p:grpSpPr>
@@ -28810,7 +29023,7 @@
           </p:nvSpPr>
           <p:spPr>
             <a:xfrm>
-              <a:off x="716850" y="1864738"/>
+              <a:off x="817335" y="1864738"/>
               <a:ext cx="1700700" cy="620400"/>
             </a:xfrm>
             <a:prstGeom prst="roundRect">
@@ -28853,7 +29066,7 @@
                 </a:spcAft>
                 <a:buNone/>
               </a:pPr>
-              <a:endParaRPr sz="2000">
+              <a:endParaRPr sz="2000" dirty="0">
                 <a:solidFill>
                   <a:schemeClr val="dk1"/>
                 </a:solidFill>
@@ -28873,7 +29086,7 @@
           </p:nvSpPr>
           <p:spPr>
             <a:xfrm>
-              <a:off x="716850" y="1864738"/>
+              <a:off x="817335" y="1864738"/>
               <a:ext cx="1700700" cy="620400"/>
             </a:xfrm>
             <a:prstGeom prst="roundRect">
@@ -29065,19 +29278,7 @@
                   <a:cs typeface="Fredoka One"/>
                   <a:sym typeface="Fredoka One"/>
                 </a:rPr>
-                <a:t>Personalización de </a:t>
-              </a:r>
-              <a:r>
-                <a:rPr lang="es-MX" sz="1800" dirty="0" err="1">
-                  <a:solidFill>
-                    <a:schemeClr val="dk1"/>
-                  </a:solidFill>
-                  <a:latin typeface="Fredoka One"/>
-                  <a:ea typeface="Fredoka One"/>
-                  <a:cs typeface="Fredoka One"/>
-                  <a:sym typeface="Fredoka One"/>
-                </a:rPr>
-                <a:t>okto</a:t>
+                <a:t>Personalización de Okto</a:t>
               </a:r>
               <a:endParaRPr sz="1800" dirty="0">
                 <a:solidFill>
@@ -29702,7 +29903,7 @@
             </a:pPr>
             <a:r>
               <a:rPr lang="en" dirty="0"/>
-              <a:t>— okto</a:t>
+              <a:t>— Okto</a:t>
             </a:r>
             <a:endParaRPr dirty="0"/>
           </a:p>
@@ -29744,7 +29945,7 @@
             </a:pPr>
             <a:r>
               <a:rPr lang="en" dirty="0"/>
-              <a:t>Esta app estará dirigida a usuarios con problemas de organizacion, falta de motivacion, tdah entre otras</a:t>
+              <a:t>Esta app estará dirigida a usuarios con problemas de organizacion, falta de motivacion, TDAH entre otras.</a:t>
             </a:r>
             <a:endParaRPr dirty="0"/>
           </a:p>
@@ -31980,8 +32181,8 @@
         </p:nvSpPr>
         <p:spPr>
           <a:xfrm>
-            <a:off x="1959794" y="3796715"/>
-            <a:ext cx="2797791" cy="420600"/>
+            <a:off x="1969847" y="3543752"/>
+            <a:ext cx="2442298" cy="770359"/>
           </a:xfrm>
           <a:prstGeom prst="rect">
             <a:avLst/>
@@ -32022,8 +32223,8 @@
         </p:nvSpPr>
         <p:spPr>
           <a:xfrm>
-            <a:off x="1967776" y="2408668"/>
-            <a:ext cx="2516883" cy="420600"/>
+            <a:off x="1967776" y="2092901"/>
+            <a:ext cx="2516883" cy="736367"/>
           </a:xfrm>
           <a:prstGeom prst="rect">
             <a:avLst/>
@@ -32046,7 +32247,7 @@
             </a:pPr>
             <a:r>
               <a:rPr lang="en" dirty="0"/>
-              <a:t>Sincronizacion en la nube</a:t>
+              <a:t>Sincronización en la nube</a:t>
             </a:r>
             <a:endParaRPr dirty="0"/>
           </a:p>
@@ -32064,8 +32265,8 @@
         </p:nvSpPr>
         <p:spPr>
           <a:xfrm>
-            <a:off x="5489038" y="2198368"/>
-            <a:ext cx="2871878" cy="420600"/>
+            <a:off x="5647509" y="2079392"/>
+            <a:ext cx="1988965" cy="755193"/>
           </a:xfrm>
           <a:prstGeom prst="rect">
             <a:avLst/>
@@ -32088,7 +32289,14 @@
             </a:pPr>
             <a:r>
               <a:rPr lang="en" dirty="0"/>
-              <a:t>Ranking entre amigos</a:t>
+              <a:t>Ranking entre</a:t>
+            </a:r>
+            <a:br>
+              <a:rPr lang="en" dirty="0"/>
+            </a:br>
+            <a:r>
+              <a:rPr lang="en" dirty="0"/>
+              <a:t>amigos</a:t>
             </a:r>
             <a:endParaRPr dirty="0"/>
           </a:p>
@@ -32106,8 +32314,8 @@
         </p:nvSpPr>
         <p:spPr>
           <a:xfrm>
-            <a:off x="5639923" y="3757692"/>
-            <a:ext cx="2297100" cy="420600"/>
+            <a:off x="5659731" y="3535045"/>
+            <a:ext cx="1669216" cy="755193"/>
           </a:xfrm>
           <a:prstGeom prst="rect">
             <a:avLst/>
@@ -32592,7 +32800,7 @@
           <p:spPr>
             <a:xfrm>
               <a:off x="1440544" y="1661609"/>
-              <a:ext cx="1026600" cy="1026600"/>
+              <a:ext cx="1026600" cy="1026601"/>
             </a:xfrm>
             <a:prstGeom prst="roundRect">
               <a:avLst>
@@ -32648,7 +32856,7 @@
         </p:nvSpPr>
         <p:spPr>
           <a:xfrm>
-            <a:off x="4893772" y="3712104"/>
+            <a:off x="1367483" y="2262919"/>
             <a:ext cx="358199" cy="359154"/>
           </a:xfrm>
           <a:custGeom>
@@ -32901,765 +33109,6 @@
       </p:sp>
       <p:grpSp>
         <p:nvGrpSpPr>
-          <p:cNvPr id="1090" name="Google Shape;1090;p50"/>
-          <p:cNvGrpSpPr/>
-          <p:nvPr/>
-        </p:nvGrpSpPr>
-        <p:grpSpPr>
-          <a:xfrm>
-            <a:off x="1394606" y="2246907"/>
-            <a:ext cx="314006" cy="359154"/>
-            <a:chOff x="-47509225" y="1974175"/>
-            <a:chExt cx="263075" cy="300900"/>
-          </a:xfrm>
-        </p:grpSpPr>
-        <p:sp>
-          <p:nvSpPr>
-            <p:cNvPr id="1091" name="Google Shape;1091;p50"/>
-            <p:cNvSpPr/>
-            <p:nvPr/>
-          </p:nvSpPr>
-          <p:spPr>
-            <a:xfrm>
-              <a:off x="-47439925" y="2026950"/>
-              <a:ext cx="124475" cy="124450"/>
-            </a:xfrm>
-            <a:custGeom>
-              <a:avLst/>
-              <a:gdLst/>
-              <a:ahLst/>
-              <a:cxnLst/>
-              <a:rect l="l" t="t" r="r" b="b"/>
-              <a:pathLst>
-                <a:path w="4979" h="4978" extrusionOk="0">
-                  <a:moveTo>
-                    <a:pt x="1828" y="725"/>
-                  </a:moveTo>
-                  <a:cubicBezTo>
-                    <a:pt x="2301" y="725"/>
-                    <a:pt x="2679" y="1008"/>
-                    <a:pt x="2805" y="1418"/>
-                  </a:cubicBezTo>
-                  <a:lnTo>
-                    <a:pt x="1828" y="1418"/>
-                  </a:lnTo>
-                  <a:cubicBezTo>
-                    <a:pt x="1607" y="1418"/>
-                    <a:pt x="1450" y="1575"/>
-                    <a:pt x="1450" y="1796"/>
-                  </a:cubicBezTo>
-                  <a:lnTo>
-                    <a:pt x="1450" y="2773"/>
-                  </a:lnTo>
-                  <a:cubicBezTo>
-                    <a:pt x="1040" y="2615"/>
-                    <a:pt x="757" y="2206"/>
-                    <a:pt x="757" y="1796"/>
-                  </a:cubicBezTo>
-                  <a:cubicBezTo>
-                    <a:pt x="757" y="1197"/>
-                    <a:pt x="1229" y="725"/>
-                    <a:pt x="1828" y="725"/>
-                  </a:cubicBezTo>
-                  <a:close/>
-                  <a:moveTo>
-                    <a:pt x="2805" y="2143"/>
-                  </a:moveTo>
-                  <a:cubicBezTo>
-                    <a:pt x="2679" y="2458"/>
-                    <a:pt x="2458" y="2678"/>
-                    <a:pt x="2175" y="2773"/>
-                  </a:cubicBezTo>
-                  <a:lnTo>
-                    <a:pt x="2175" y="2143"/>
-                  </a:lnTo>
-                  <a:close/>
-                  <a:moveTo>
-                    <a:pt x="4254" y="2111"/>
-                  </a:moveTo>
-                  <a:lnTo>
-                    <a:pt x="4254" y="4222"/>
-                  </a:lnTo>
-                  <a:lnTo>
-                    <a:pt x="2143" y="4222"/>
-                  </a:lnTo>
-                  <a:lnTo>
-                    <a:pt x="2143" y="3466"/>
-                  </a:lnTo>
-                  <a:cubicBezTo>
-                    <a:pt x="2805" y="3308"/>
-                    <a:pt x="3372" y="2804"/>
-                    <a:pt x="3529" y="2111"/>
-                  </a:cubicBezTo>
-                  <a:close/>
-                  <a:moveTo>
-                    <a:pt x="1765" y="0"/>
-                  </a:moveTo>
-                  <a:cubicBezTo>
-                    <a:pt x="788" y="0"/>
-                    <a:pt x="1" y="788"/>
-                    <a:pt x="1" y="1796"/>
-                  </a:cubicBezTo>
-                  <a:cubicBezTo>
-                    <a:pt x="1" y="2647"/>
-                    <a:pt x="599" y="3340"/>
-                    <a:pt x="1418" y="3529"/>
-                  </a:cubicBezTo>
-                  <a:lnTo>
-                    <a:pt x="1418" y="4631"/>
-                  </a:lnTo>
-                  <a:cubicBezTo>
-                    <a:pt x="1418" y="4820"/>
-                    <a:pt x="1576" y="4978"/>
-                    <a:pt x="1765" y="4978"/>
-                  </a:cubicBezTo>
-                  <a:lnTo>
-                    <a:pt x="4569" y="4978"/>
-                  </a:lnTo>
-                  <a:cubicBezTo>
-                    <a:pt x="4789" y="4978"/>
-                    <a:pt x="4916" y="4820"/>
-                    <a:pt x="4916" y="4631"/>
-                  </a:cubicBezTo>
-                  <a:lnTo>
-                    <a:pt x="4916" y="1827"/>
-                  </a:lnTo>
-                  <a:cubicBezTo>
-                    <a:pt x="4979" y="1575"/>
-                    <a:pt x="4821" y="1418"/>
-                    <a:pt x="4600" y="1418"/>
-                  </a:cubicBezTo>
-                  <a:lnTo>
-                    <a:pt x="3498" y="1418"/>
-                  </a:lnTo>
-                  <a:cubicBezTo>
-                    <a:pt x="3340" y="630"/>
-                    <a:pt x="2647" y="0"/>
-                    <a:pt x="1765" y="0"/>
-                  </a:cubicBezTo>
-                  <a:close/>
-                </a:path>
-              </a:pathLst>
-            </a:custGeom>
-            <a:solidFill>
-              <a:schemeClr val="lt1"/>
-            </a:solidFill>
-            <a:ln>
-              <a:noFill/>
-            </a:ln>
-          </p:spPr>
-          <p:txBody>
-            <a:bodyPr spcFirstLastPara="1" wrap="square" lIns="91425" tIns="91425" rIns="91425" bIns="91425" anchor="ctr" anchorCtr="0">
-              <a:noAutofit/>
-            </a:bodyPr>
-            <a:lstStyle/>
-            <a:p>
-              <a:pPr marL="0" lvl="0" indent="0" algn="l" rtl="0">
-                <a:spcBef>
-                  <a:spcPts val="0"/>
-                </a:spcBef>
-                <a:spcAft>
-                  <a:spcPts val="0"/>
-                </a:spcAft>
-                <a:buNone/>
-              </a:pPr>
-              <a:endParaRPr/>
-            </a:p>
-          </p:txBody>
-        </p:sp>
-        <p:sp>
-          <p:nvSpPr>
-            <p:cNvPr id="1092" name="Google Shape;1092;p50"/>
-            <p:cNvSpPr/>
-            <p:nvPr/>
-          </p:nvSpPr>
-          <p:spPr>
-            <a:xfrm>
-              <a:off x="-47439125" y="2184475"/>
-              <a:ext cx="88225" cy="18125"/>
-            </a:xfrm>
-            <a:custGeom>
-              <a:avLst/>
-              <a:gdLst/>
-              <a:ahLst/>
-              <a:cxnLst/>
-              <a:rect l="l" t="t" r="r" b="b"/>
-              <a:pathLst>
-                <a:path w="3529" h="725" extrusionOk="0">
-                  <a:moveTo>
-                    <a:pt x="378" y="0"/>
-                  </a:moveTo>
-                  <a:cubicBezTo>
-                    <a:pt x="158" y="0"/>
-                    <a:pt x="32" y="158"/>
-                    <a:pt x="32" y="378"/>
-                  </a:cubicBezTo>
-                  <a:cubicBezTo>
-                    <a:pt x="0" y="567"/>
-                    <a:pt x="158" y="725"/>
-                    <a:pt x="378" y="725"/>
-                  </a:cubicBezTo>
-                  <a:lnTo>
-                    <a:pt x="3182" y="725"/>
-                  </a:lnTo>
-                  <a:cubicBezTo>
-                    <a:pt x="3371" y="725"/>
-                    <a:pt x="3529" y="567"/>
-                    <a:pt x="3529" y="378"/>
-                  </a:cubicBezTo>
-                  <a:cubicBezTo>
-                    <a:pt x="3529" y="158"/>
-                    <a:pt x="3371" y="0"/>
-                    <a:pt x="3182" y="0"/>
-                  </a:cubicBezTo>
-                  <a:close/>
-                </a:path>
-              </a:pathLst>
-            </a:custGeom>
-            <a:solidFill>
-              <a:schemeClr val="lt1"/>
-            </a:solidFill>
-            <a:ln>
-              <a:noFill/>
-            </a:ln>
-          </p:spPr>
-          <p:txBody>
-            <a:bodyPr spcFirstLastPara="1" wrap="square" lIns="91425" tIns="91425" rIns="91425" bIns="91425" anchor="ctr" anchorCtr="0">
-              <a:noAutofit/>
-            </a:bodyPr>
-            <a:lstStyle/>
-            <a:p>
-              <a:pPr marL="0" lvl="0" indent="0" algn="l" rtl="0">
-                <a:spcBef>
-                  <a:spcPts val="0"/>
-                </a:spcBef>
-                <a:spcAft>
-                  <a:spcPts val="0"/>
-                </a:spcAft>
-                <a:buNone/>
-              </a:pPr>
-              <a:endParaRPr/>
-            </a:p>
-          </p:txBody>
-        </p:sp>
-        <p:sp>
-          <p:nvSpPr>
-            <p:cNvPr id="1093" name="Google Shape;1093;p50"/>
-            <p:cNvSpPr/>
-            <p:nvPr/>
-          </p:nvSpPr>
-          <p:spPr>
-            <a:xfrm>
-              <a:off x="-47438350" y="2219900"/>
-              <a:ext cx="122900" cy="18150"/>
-            </a:xfrm>
-            <a:custGeom>
-              <a:avLst/>
-              <a:gdLst/>
-              <a:ahLst/>
-              <a:cxnLst/>
-              <a:rect l="l" t="t" r="r" b="b"/>
-              <a:pathLst>
-                <a:path w="4916" h="726" extrusionOk="0">
-                  <a:moveTo>
-                    <a:pt x="347" y="1"/>
-                  </a:moveTo>
-                  <a:cubicBezTo>
-                    <a:pt x="127" y="1"/>
-                    <a:pt x="1" y="158"/>
-                    <a:pt x="1" y="379"/>
-                  </a:cubicBezTo>
-                  <a:cubicBezTo>
-                    <a:pt x="1" y="568"/>
-                    <a:pt x="127" y="725"/>
-                    <a:pt x="347" y="725"/>
-                  </a:cubicBezTo>
-                  <a:lnTo>
-                    <a:pt x="4537" y="725"/>
-                  </a:lnTo>
-                  <a:cubicBezTo>
-                    <a:pt x="4758" y="725"/>
-                    <a:pt x="4916" y="568"/>
-                    <a:pt x="4916" y="379"/>
-                  </a:cubicBezTo>
-                  <a:cubicBezTo>
-                    <a:pt x="4916" y="158"/>
-                    <a:pt x="4758" y="1"/>
-                    <a:pt x="4537" y="1"/>
-                  </a:cubicBezTo>
-                  <a:close/>
-                </a:path>
-              </a:pathLst>
-            </a:custGeom>
-            <a:solidFill>
-              <a:schemeClr val="lt1"/>
-            </a:solidFill>
-            <a:ln>
-              <a:noFill/>
-            </a:ln>
-          </p:spPr>
-          <p:txBody>
-            <a:bodyPr spcFirstLastPara="1" wrap="square" lIns="91425" tIns="91425" rIns="91425" bIns="91425" anchor="ctr" anchorCtr="0">
-              <a:noAutofit/>
-            </a:bodyPr>
-            <a:lstStyle/>
-            <a:p>
-              <a:pPr marL="0" lvl="0" indent="0" algn="l" rtl="0">
-                <a:spcBef>
-                  <a:spcPts val="0"/>
-                </a:spcBef>
-                <a:spcAft>
-                  <a:spcPts val="0"/>
-                </a:spcAft>
-                <a:buNone/>
-              </a:pPr>
-              <a:endParaRPr/>
-            </a:p>
-          </p:txBody>
-        </p:sp>
-        <p:sp>
-          <p:nvSpPr>
-            <p:cNvPr id="1094" name="Google Shape;1094;p50"/>
-            <p:cNvSpPr/>
-            <p:nvPr/>
-          </p:nvSpPr>
-          <p:spPr>
-            <a:xfrm>
-              <a:off x="-47333600" y="2186050"/>
-              <a:ext cx="18150" cy="17350"/>
-            </a:xfrm>
-            <a:custGeom>
-              <a:avLst/>
-              <a:gdLst/>
-              <a:ahLst/>
-              <a:cxnLst/>
-              <a:rect l="l" t="t" r="r" b="b"/>
-              <a:pathLst>
-                <a:path w="726" h="694" extrusionOk="0">
-                  <a:moveTo>
-                    <a:pt x="347" y="0"/>
-                  </a:moveTo>
-                  <a:cubicBezTo>
-                    <a:pt x="158" y="0"/>
-                    <a:pt x="1" y="158"/>
-                    <a:pt x="1" y="347"/>
-                  </a:cubicBezTo>
-                  <a:cubicBezTo>
-                    <a:pt x="1" y="536"/>
-                    <a:pt x="158" y="693"/>
-                    <a:pt x="347" y="693"/>
-                  </a:cubicBezTo>
-                  <a:cubicBezTo>
-                    <a:pt x="568" y="693"/>
-                    <a:pt x="726" y="536"/>
-                    <a:pt x="726" y="347"/>
-                  </a:cubicBezTo>
-                  <a:cubicBezTo>
-                    <a:pt x="726" y="126"/>
-                    <a:pt x="568" y="0"/>
-                    <a:pt x="347" y="0"/>
-                  </a:cubicBezTo>
-                  <a:close/>
-                </a:path>
-              </a:pathLst>
-            </a:custGeom>
-            <a:solidFill>
-              <a:schemeClr val="lt1"/>
-            </a:solidFill>
-            <a:ln>
-              <a:noFill/>
-            </a:ln>
-          </p:spPr>
-          <p:txBody>
-            <a:bodyPr spcFirstLastPara="1" wrap="square" lIns="91425" tIns="91425" rIns="91425" bIns="91425" anchor="ctr" anchorCtr="0">
-              <a:noAutofit/>
-            </a:bodyPr>
-            <a:lstStyle/>
-            <a:p>
-              <a:pPr marL="0" lvl="0" indent="0" algn="l" rtl="0">
-                <a:spcBef>
-                  <a:spcPts val="0"/>
-                </a:spcBef>
-                <a:spcAft>
-                  <a:spcPts val="0"/>
-                </a:spcAft>
-                <a:buNone/>
-              </a:pPr>
-              <a:endParaRPr/>
-            </a:p>
-          </p:txBody>
-        </p:sp>
-        <p:sp>
-          <p:nvSpPr>
-            <p:cNvPr id="1095" name="Google Shape;1095;p50"/>
-            <p:cNvSpPr/>
-            <p:nvPr/>
-          </p:nvSpPr>
-          <p:spPr>
-            <a:xfrm>
-              <a:off x="-47509225" y="1974175"/>
-              <a:ext cx="263075" cy="300900"/>
-            </a:xfrm>
-            <a:custGeom>
-              <a:avLst/>
-              <a:gdLst/>
-              <a:ahLst/>
-              <a:cxnLst/>
-              <a:rect l="l" t="t" r="r" b="b"/>
-              <a:pathLst>
-                <a:path w="10523" h="12036" extrusionOk="0">
-                  <a:moveTo>
-                    <a:pt x="9483" y="2111"/>
-                  </a:moveTo>
-                  <a:cubicBezTo>
-                    <a:pt x="9672" y="2111"/>
-                    <a:pt x="9830" y="2269"/>
-                    <a:pt x="9830" y="2489"/>
-                  </a:cubicBezTo>
-                  <a:lnTo>
-                    <a:pt x="9830" y="3529"/>
-                  </a:lnTo>
-                  <a:lnTo>
-                    <a:pt x="9105" y="3529"/>
-                  </a:lnTo>
-                  <a:lnTo>
-                    <a:pt x="9105" y="2111"/>
-                  </a:lnTo>
-                  <a:close/>
-                  <a:moveTo>
-                    <a:pt x="9830" y="4222"/>
-                  </a:moveTo>
-                  <a:lnTo>
-                    <a:pt x="9830" y="5640"/>
-                  </a:lnTo>
-                  <a:lnTo>
-                    <a:pt x="9105" y="5640"/>
-                  </a:lnTo>
-                  <a:lnTo>
-                    <a:pt x="9105" y="4222"/>
-                  </a:lnTo>
-                  <a:close/>
-                  <a:moveTo>
-                    <a:pt x="9861" y="6333"/>
-                  </a:moveTo>
-                  <a:lnTo>
-                    <a:pt x="9861" y="7751"/>
-                  </a:lnTo>
-                  <a:lnTo>
-                    <a:pt x="9168" y="7751"/>
-                  </a:lnTo>
-                  <a:lnTo>
-                    <a:pt x="9168" y="6333"/>
-                  </a:lnTo>
-                  <a:close/>
-                  <a:moveTo>
-                    <a:pt x="9830" y="8412"/>
-                  </a:moveTo>
-                  <a:lnTo>
-                    <a:pt x="9830" y="9483"/>
-                  </a:lnTo>
-                  <a:cubicBezTo>
-                    <a:pt x="9830" y="9672"/>
-                    <a:pt x="9672" y="9830"/>
-                    <a:pt x="9483" y="9830"/>
-                  </a:cubicBezTo>
-                  <a:lnTo>
-                    <a:pt x="9137" y="9830"/>
-                  </a:lnTo>
-                  <a:lnTo>
-                    <a:pt x="9137" y="8412"/>
-                  </a:lnTo>
-                  <a:close/>
-                  <a:moveTo>
-                    <a:pt x="8444" y="630"/>
-                  </a:moveTo>
-                  <a:lnTo>
-                    <a:pt x="8444" y="11248"/>
-                  </a:lnTo>
-                  <a:lnTo>
-                    <a:pt x="1450" y="11248"/>
-                  </a:lnTo>
-                  <a:lnTo>
-                    <a:pt x="1450" y="10554"/>
-                  </a:lnTo>
-                  <a:lnTo>
-                    <a:pt x="1796" y="10554"/>
-                  </a:lnTo>
-                  <a:cubicBezTo>
-                    <a:pt x="1985" y="10554"/>
-                    <a:pt x="2143" y="10397"/>
-                    <a:pt x="2143" y="10176"/>
-                  </a:cubicBezTo>
-                  <a:cubicBezTo>
-                    <a:pt x="2143" y="9987"/>
-                    <a:pt x="1985" y="9830"/>
-                    <a:pt x="1796" y="9830"/>
-                  </a:cubicBezTo>
-                  <a:lnTo>
-                    <a:pt x="1450" y="9830"/>
-                  </a:lnTo>
-                  <a:lnTo>
-                    <a:pt x="1450" y="8412"/>
-                  </a:lnTo>
-                  <a:lnTo>
-                    <a:pt x="1796" y="8412"/>
-                  </a:lnTo>
-                  <a:cubicBezTo>
-                    <a:pt x="1985" y="8412"/>
-                    <a:pt x="2143" y="8255"/>
-                    <a:pt x="2143" y="8066"/>
-                  </a:cubicBezTo>
-                  <a:cubicBezTo>
-                    <a:pt x="2143" y="7877"/>
-                    <a:pt x="1985" y="7719"/>
-                    <a:pt x="1796" y="7719"/>
-                  </a:cubicBezTo>
-                  <a:lnTo>
-                    <a:pt x="1450" y="7719"/>
-                  </a:lnTo>
-                  <a:lnTo>
-                    <a:pt x="1450" y="6301"/>
-                  </a:lnTo>
-                  <a:lnTo>
-                    <a:pt x="1796" y="6301"/>
-                  </a:lnTo>
-                  <a:cubicBezTo>
-                    <a:pt x="1985" y="6301"/>
-                    <a:pt x="2143" y="6144"/>
-                    <a:pt x="2143" y="5923"/>
-                  </a:cubicBezTo>
-                  <a:cubicBezTo>
-                    <a:pt x="2143" y="5734"/>
-                    <a:pt x="1985" y="5577"/>
-                    <a:pt x="1796" y="5577"/>
-                  </a:cubicBezTo>
-                  <a:lnTo>
-                    <a:pt x="1450" y="5577"/>
-                  </a:lnTo>
-                  <a:lnTo>
-                    <a:pt x="1450" y="4159"/>
-                  </a:lnTo>
-                  <a:lnTo>
-                    <a:pt x="1796" y="4159"/>
-                  </a:lnTo>
-                  <a:cubicBezTo>
-                    <a:pt x="1985" y="4159"/>
-                    <a:pt x="2143" y="4001"/>
-                    <a:pt x="2143" y="3812"/>
-                  </a:cubicBezTo>
-                  <a:cubicBezTo>
-                    <a:pt x="2143" y="3623"/>
-                    <a:pt x="1985" y="3466"/>
-                    <a:pt x="1796" y="3466"/>
-                  </a:cubicBezTo>
-                  <a:lnTo>
-                    <a:pt x="1450" y="3466"/>
-                  </a:lnTo>
-                  <a:lnTo>
-                    <a:pt x="1450" y="2048"/>
-                  </a:lnTo>
-                  <a:lnTo>
-                    <a:pt x="1796" y="2048"/>
-                  </a:lnTo>
-                  <a:cubicBezTo>
-                    <a:pt x="1985" y="2048"/>
-                    <a:pt x="2143" y="1891"/>
-                    <a:pt x="2143" y="1670"/>
-                  </a:cubicBezTo>
-                  <a:cubicBezTo>
-                    <a:pt x="2143" y="1481"/>
-                    <a:pt x="1985" y="1324"/>
-                    <a:pt x="1796" y="1324"/>
-                  </a:cubicBezTo>
-                  <a:lnTo>
-                    <a:pt x="1450" y="1324"/>
-                  </a:lnTo>
-                  <a:lnTo>
-                    <a:pt x="1450" y="630"/>
-                  </a:lnTo>
-                  <a:close/>
-                  <a:moveTo>
-                    <a:pt x="1040" y="0"/>
-                  </a:moveTo>
-                  <a:cubicBezTo>
-                    <a:pt x="851" y="0"/>
-                    <a:pt x="693" y="158"/>
-                    <a:pt x="693" y="347"/>
-                  </a:cubicBezTo>
-                  <a:lnTo>
-                    <a:pt x="693" y="1418"/>
-                  </a:lnTo>
-                  <a:lnTo>
-                    <a:pt x="347" y="1418"/>
-                  </a:lnTo>
-                  <a:cubicBezTo>
-                    <a:pt x="158" y="1418"/>
-                    <a:pt x="0" y="1576"/>
-                    <a:pt x="0" y="1765"/>
-                  </a:cubicBezTo>
-                  <a:cubicBezTo>
-                    <a:pt x="0" y="1954"/>
-                    <a:pt x="158" y="2111"/>
-                    <a:pt x="347" y="2111"/>
-                  </a:cubicBezTo>
-                  <a:lnTo>
-                    <a:pt x="693" y="2111"/>
-                  </a:lnTo>
-                  <a:lnTo>
-                    <a:pt x="693" y="3529"/>
-                  </a:lnTo>
-                  <a:lnTo>
-                    <a:pt x="347" y="3529"/>
-                  </a:lnTo>
-                  <a:cubicBezTo>
-                    <a:pt x="158" y="3529"/>
-                    <a:pt x="0" y="3686"/>
-                    <a:pt x="0" y="3907"/>
-                  </a:cubicBezTo>
-                  <a:cubicBezTo>
-                    <a:pt x="0" y="4096"/>
-                    <a:pt x="158" y="4254"/>
-                    <a:pt x="347" y="4254"/>
-                  </a:cubicBezTo>
-                  <a:lnTo>
-                    <a:pt x="693" y="4254"/>
-                  </a:lnTo>
-                  <a:lnTo>
-                    <a:pt x="693" y="5671"/>
-                  </a:lnTo>
-                  <a:lnTo>
-                    <a:pt x="347" y="5671"/>
-                  </a:lnTo>
-                  <a:cubicBezTo>
-                    <a:pt x="158" y="5671"/>
-                    <a:pt x="0" y="5829"/>
-                    <a:pt x="0" y="6018"/>
-                  </a:cubicBezTo>
-                  <a:cubicBezTo>
-                    <a:pt x="0" y="6207"/>
-                    <a:pt x="158" y="6364"/>
-                    <a:pt x="347" y="6364"/>
-                  </a:cubicBezTo>
-                  <a:lnTo>
-                    <a:pt x="693" y="6364"/>
-                  </a:lnTo>
-                  <a:lnTo>
-                    <a:pt x="693" y="7782"/>
-                  </a:lnTo>
-                  <a:lnTo>
-                    <a:pt x="347" y="7782"/>
-                  </a:lnTo>
-                  <a:cubicBezTo>
-                    <a:pt x="158" y="7782"/>
-                    <a:pt x="0" y="7940"/>
-                    <a:pt x="0" y="8160"/>
-                  </a:cubicBezTo>
-                  <a:cubicBezTo>
-                    <a:pt x="0" y="8349"/>
-                    <a:pt x="158" y="8507"/>
-                    <a:pt x="347" y="8507"/>
-                  </a:cubicBezTo>
-                  <a:lnTo>
-                    <a:pt x="693" y="8507"/>
-                  </a:lnTo>
-                  <a:lnTo>
-                    <a:pt x="693" y="9924"/>
-                  </a:lnTo>
-                  <a:lnTo>
-                    <a:pt x="347" y="9924"/>
-                  </a:lnTo>
-                  <a:cubicBezTo>
-                    <a:pt x="158" y="9924"/>
-                    <a:pt x="0" y="10082"/>
-                    <a:pt x="0" y="10271"/>
-                  </a:cubicBezTo>
-                  <a:cubicBezTo>
-                    <a:pt x="0" y="10460"/>
-                    <a:pt x="158" y="10617"/>
-                    <a:pt x="347" y="10617"/>
-                  </a:cubicBezTo>
-                  <a:lnTo>
-                    <a:pt x="693" y="10617"/>
-                  </a:lnTo>
-                  <a:lnTo>
-                    <a:pt x="693" y="11689"/>
-                  </a:lnTo>
-                  <a:cubicBezTo>
-                    <a:pt x="693" y="11878"/>
-                    <a:pt x="851" y="12035"/>
-                    <a:pt x="1040" y="12035"/>
-                  </a:cubicBezTo>
-                  <a:lnTo>
-                    <a:pt x="8759" y="12035"/>
-                  </a:lnTo>
-                  <a:cubicBezTo>
-                    <a:pt x="8979" y="12035"/>
-                    <a:pt x="9137" y="11878"/>
-                    <a:pt x="9137" y="11689"/>
-                  </a:cubicBezTo>
-                  <a:lnTo>
-                    <a:pt x="9137" y="10617"/>
-                  </a:lnTo>
-                  <a:lnTo>
-                    <a:pt x="9483" y="10617"/>
-                  </a:lnTo>
-                  <a:cubicBezTo>
-                    <a:pt x="10050" y="10617"/>
-                    <a:pt x="10523" y="10145"/>
-                    <a:pt x="10523" y="9578"/>
-                  </a:cubicBezTo>
-                  <a:lnTo>
-                    <a:pt x="10523" y="2552"/>
-                  </a:lnTo>
-                  <a:cubicBezTo>
-                    <a:pt x="10523" y="1891"/>
-                    <a:pt x="10050" y="1418"/>
-                    <a:pt x="9483" y="1418"/>
-                  </a:cubicBezTo>
-                  <a:lnTo>
-                    <a:pt x="9137" y="1418"/>
-                  </a:lnTo>
-                  <a:lnTo>
-                    <a:pt x="9137" y="347"/>
-                  </a:lnTo>
-                  <a:cubicBezTo>
-                    <a:pt x="9137" y="158"/>
-                    <a:pt x="8979" y="0"/>
-                    <a:pt x="8759" y="0"/>
-                  </a:cubicBezTo>
-                  <a:close/>
-                </a:path>
-              </a:pathLst>
-            </a:custGeom>
-            <a:solidFill>
-              <a:schemeClr val="lt1"/>
-            </a:solidFill>
-            <a:ln>
-              <a:noFill/>
-            </a:ln>
-          </p:spPr>
-          <p:txBody>
-            <a:bodyPr spcFirstLastPara="1" wrap="square" lIns="91425" tIns="91425" rIns="91425" bIns="91425" anchor="ctr" anchorCtr="0">
-              <a:noAutofit/>
-            </a:bodyPr>
-            <a:lstStyle/>
-            <a:p>
-              <a:pPr marL="0" lvl="0" indent="0" algn="l" rtl="0">
-                <a:spcBef>
-                  <a:spcPts val="0"/>
-                </a:spcBef>
-                <a:spcAft>
-                  <a:spcPts val="0"/>
-                </a:spcAft>
-                <a:buNone/>
-              </a:pPr>
-              <a:endParaRPr/>
-            </a:p>
-          </p:txBody>
-        </p:sp>
-      </p:grpSp>
-      <p:grpSp>
-        <p:nvGrpSpPr>
           <p:cNvPr id="1096" name="Google Shape;1096;p50"/>
           <p:cNvGrpSpPr/>
           <p:nvPr/>
@@ -34256,339 +33705,6 @@
           </p:txBody>
         </p:sp>
       </p:grpSp>
-      <p:sp>
-        <p:nvSpPr>
-          <p:cNvPr id="1103" name="Google Shape;1103;p50"/>
-          <p:cNvSpPr/>
-          <p:nvPr/>
-        </p:nvSpPr>
-        <p:spPr>
-          <a:xfrm>
-            <a:off x="4915391" y="2247847"/>
-            <a:ext cx="314961" cy="357274"/>
-          </a:xfrm>
-          <a:custGeom>
-            <a:avLst/>
-            <a:gdLst/>
-            <a:ahLst/>
-            <a:cxnLst/>
-            <a:rect l="l" t="t" r="r" b="b"/>
-            <a:pathLst>
-              <a:path w="10555" h="11973" extrusionOk="0">
-                <a:moveTo>
-                  <a:pt x="3151" y="2836"/>
-                </a:moveTo>
-                <a:cubicBezTo>
-                  <a:pt x="3340" y="2836"/>
-                  <a:pt x="3498" y="2994"/>
-                  <a:pt x="3498" y="3183"/>
-                </a:cubicBezTo>
-                <a:lnTo>
-                  <a:pt x="3498" y="3529"/>
-                </a:lnTo>
-                <a:lnTo>
-                  <a:pt x="2805" y="3529"/>
-                </a:lnTo>
-                <a:lnTo>
-                  <a:pt x="2805" y="3183"/>
-                </a:lnTo>
-                <a:cubicBezTo>
-                  <a:pt x="2805" y="2994"/>
-                  <a:pt x="2962" y="2836"/>
-                  <a:pt x="3151" y="2836"/>
-                </a:cubicBezTo>
-                <a:close/>
-                <a:moveTo>
-                  <a:pt x="9862" y="4191"/>
-                </a:moveTo>
-                <a:lnTo>
-                  <a:pt x="9862" y="5262"/>
-                </a:lnTo>
-                <a:cubicBezTo>
-                  <a:pt x="9862" y="5451"/>
-                  <a:pt x="9704" y="5609"/>
-                  <a:pt x="9484" y="5609"/>
-                </a:cubicBezTo>
-                <a:cubicBezTo>
-                  <a:pt x="9295" y="5609"/>
-                  <a:pt x="9137" y="5451"/>
-                  <a:pt x="9137" y="5262"/>
-                </a:cubicBezTo>
-                <a:lnTo>
-                  <a:pt x="9137" y="4191"/>
-                </a:lnTo>
-                <a:close/>
-                <a:moveTo>
-                  <a:pt x="3151" y="5609"/>
-                </a:moveTo>
-                <a:cubicBezTo>
-                  <a:pt x="3340" y="5609"/>
-                  <a:pt x="3498" y="5766"/>
-                  <a:pt x="3498" y="5987"/>
-                </a:cubicBezTo>
-                <a:cubicBezTo>
-                  <a:pt x="3498" y="6176"/>
-                  <a:pt x="3340" y="6333"/>
-                  <a:pt x="3151" y="6333"/>
-                </a:cubicBezTo>
-                <a:cubicBezTo>
-                  <a:pt x="2962" y="6333"/>
-                  <a:pt x="2805" y="6176"/>
-                  <a:pt x="2805" y="5987"/>
-                </a:cubicBezTo>
-                <a:cubicBezTo>
-                  <a:pt x="2805" y="5766"/>
-                  <a:pt x="2962" y="5609"/>
-                  <a:pt x="3151" y="5609"/>
-                </a:cubicBezTo>
-                <a:close/>
-                <a:moveTo>
-                  <a:pt x="3592" y="4254"/>
-                </a:moveTo>
-                <a:cubicBezTo>
-                  <a:pt x="4695" y="4443"/>
-                  <a:pt x="5640" y="5451"/>
-                  <a:pt x="5640" y="6680"/>
-                </a:cubicBezTo>
-                <a:lnTo>
-                  <a:pt x="5640" y="8822"/>
-                </a:lnTo>
-                <a:cubicBezTo>
-                  <a:pt x="5640" y="10145"/>
-                  <a:pt x="4538" y="11248"/>
-                  <a:pt x="3183" y="11248"/>
-                </a:cubicBezTo>
-                <a:cubicBezTo>
-                  <a:pt x="1860" y="11248"/>
-                  <a:pt x="757" y="10145"/>
-                  <a:pt x="757" y="8822"/>
-                </a:cubicBezTo>
-                <a:lnTo>
-                  <a:pt x="757" y="6680"/>
-                </a:lnTo>
-                <a:cubicBezTo>
-                  <a:pt x="757" y="5451"/>
-                  <a:pt x="1671" y="4443"/>
-                  <a:pt x="2868" y="4254"/>
-                </a:cubicBezTo>
-                <a:lnTo>
-                  <a:pt x="2868" y="4979"/>
-                </a:lnTo>
-                <a:cubicBezTo>
-                  <a:pt x="2490" y="5136"/>
-                  <a:pt x="2175" y="5546"/>
-                  <a:pt x="2175" y="5987"/>
-                </a:cubicBezTo>
-                <a:cubicBezTo>
-                  <a:pt x="2175" y="6396"/>
-                  <a:pt x="2458" y="6837"/>
-                  <a:pt x="2868" y="6963"/>
-                </a:cubicBezTo>
-                <a:lnTo>
-                  <a:pt x="2868" y="7341"/>
-                </a:lnTo>
-                <a:cubicBezTo>
-                  <a:pt x="2868" y="7562"/>
-                  <a:pt x="3025" y="7719"/>
-                  <a:pt x="3246" y="7719"/>
-                </a:cubicBezTo>
-                <a:cubicBezTo>
-                  <a:pt x="3435" y="7719"/>
-                  <a:pt x="3592" y="7562"/>
-                  <a:pt x="3592" y="7341"/>
-                </a:cubicBezTo>
-                <a:lnTo>
-                  <a:pt x="3592" y="6963"/>
-                </a:lnTo>
-                <a:cubicBezTo>
-                  <a:pt x="3970" y="6806"/>
-                  <a:pt x="4286" y="6396"/>
-                  <a:pt x="4286" y="5987"/>
-                </a:cubicBezTo>
-                <a:cubicBezTo>
-                  <a:pt x="4286" y="5546"/>
-                  <a:pt x="4033" y="5105"/>
-                  <a:pt x="3592" y="4979"/>
-                </a:cubicBezTo>
-                <a:lnTo>
-                  <a:pt x="3592" y="4254"/>
-                </a:lnTo>
-                <a:close/>
-                <a:moveTo>
-                  <a:pt x="5294" y="1"/>
-                </a:moveTo>
-                <a:cubicBezTo>
-                  <a:pt x="4033" y="1"/>
-                  <a:pt x="2994" y="946"/>
-                  <a:pt x="2836" y="2143"/>
-                </a:cubicBezTo>
-                <a:cubicBezTo>
-                  <a:pt x="2427" y="2301"/>
-                  <a:pt x="2143" y="2710"/>
-                  <a:pt x="2143" y="3151"/>
-                </a:cubicBezTo>
-                <a:lnTo>
-                  <a:pt x="2143" y="3687"/>
-                </a:lnTo>
-                <a:cubicBezTo>
-                  <a:pt x="914" y="4128"/>
-                  <a:pt x="1" y="5294"/>
-                  <a:pt x="1" y="6680"/>
-                </a:cubicBezTo>
-                <a:lnTo>
-                  <a:pt x="1" y="8822"/>
-                </a:lnTo>
-                <a:cubicBezTo>
-                  <a:pt x="1" y="10555"/>
-                  <a:pt x="1419" y="11973"/>
-                  <a:pt x="3151" y="11973"/>
-                </a:cubicBezTo>
-                <a:cubicBezTo>
-                  <a:pt x="4884" y="11973"/>
-                  <a:pt x="6302" y="10555"/>
-                  <a:pt x="6302" y="8822"/>
-                </a:cubicBezTo>
-                <a:lnTo>
-                  <a:pt x="6302" y="6680"/>
-                </a:lnTo>
-                <a:cubicBezTo>
-                  <a:pt x="6302" y="5294"/>
-                  <a:pt x="5451" y="4128"/>
-                  <a:pt x="4191" y="3687"/>
-                </a:cubicBezTo>
-                <a:lnTo>
-                  <a:pt x="4191" y="3151"/>
-                </a:lnTo>
-                <a:cubicBezTo>
-                  <a:pt x="4191" y="2710"/>
-                  <a:pt x="3907" y="2301"/>
-                  <a:pt x="3529" y="2143"/>
-                </a:cubicBezTo>
-                <a:cubicBezTo>
-                  <a:pt x="3624" y="1293"/>
-                  <a:pt x="4380" y="662"/>
-                  <a:pt x="5262" y="662"/>
-                </a:cubicBezTo>
-                <a:cubicBezTo>
-                  <a:pt x="6239" y="662"/>
-                  <a:pt x="7026" y="1450"/>
-                  <a:pt x="7026" y="2427"/>
-                </a:cubicBezTo>
-                <a:lnTo>
-                  <a:pt x="7026" y="8413"/>
-                </a:lnTo>
-                <a:cubicBezTo>
-                  <a:pt x="7026" y="9200"/>
-                  <a:pt x="7657" y="9830"/>
-                  <a:pt x="8444" y="9830"/>
-                </a:cubicBezTo>
-                <a:cubicBezTo>
-                  <a:pt x="9232" y="9830"/>
-                  <a:pt x="9862" y="9200"/>
-                  <a:pt x="9862" y="8413"/>
-                </a:cubicBezTo>
-                <a:lnTo>
-                  <a:pt x="9862" y="6239"/>
-                </a:lnTo>
-                <a:cubicBezTo>
-                  <a:pt x="10240" y="6081"/>
-                  <a:pt x="10555" y="5703"/>
-                  <a:pt x="10555" y="5262"/>
-                </a:cubicBezTo>
-                <a:lnTo>
-                  <a:pt x="10555" y="3844"/>
-                </a:lnTo>
-                <a:cubicBezTo>
-                  <a:pt x="10555" y="3687"/>
-                  <a:pt x="10397" y="3529"/>
-                  <a:pt x="10208" y="3529"/>
-                </a:cubicBezTo>
-                <a:lnTo>
-                  <a:pt x="9862" y="3529"/>
-                </a:lnTo>
-                <a:lnTo>
-                  <a:pt x="9862" y="2458"/>
-                </a:lnTo>
-                <a:cubicBezTo>
-                  <a:pt x="9862" y="2269"/>
-                  <a:pt x="9704" y="2112"/>
-                  <a:pt x="9515" y="2112"/>
-                </a:cubicBezTo>
-                <a:cubicBezTo>
-                  <a:pt x="9295" y="2112"/>
-                  <a:pt x="9137" y="2269"/>
-                  <a:pt x="9137" y="2458"/>
-                </a:cubicBezTo>
-                <a:lnTo>
-                  <a:pt x="9137" y="3529"/>
-                </a:lnTo>
-                <a:lnTo>
-                  <a:pt x="8791" y="3529"/>
-                </a:lnTo>
-                <a:cubicBezTo>
-                  <a:pt x="8602" y="3529"/>
-                  <a:pt x="8444" y="3687"/>
-                  <a:pt x="8444" y="3876"/>
-                </a:cubicBezTo>
-                <a:lnTo>
-                  <a:pt x="8444" y="5294"/>
-                </a:lnTo>
-                <a:cubicBezTo>
-                  <a:pt x="8444" y="5766"/>
-                  <a:pt x="8728" y="6176"/>
-                  <a:pt x="9137" y="6302"/>
-                </a:cubicBezTo>
-                <a:lnTo>
-                  <a:pt x="9137" y="8444"/>
-                </a:lnTo>
-                <a:cubicBezTo>
-                  <a:pt x="9137" y="8854"/>
-                  <a:pt x="8822" y="9169"/>
-                  <a:pt x="8444" y="9169"/>
-                </a:cubicBezTo>
-                <a:cubicBezTo>
-                  <a:pt x="8035" y="9169"/>
-                  <a:pt x="7720" y="8854"/>
-                  <a:pt x="7720" y="8444"/>
-                </a:cubicBezTo>
-                <a:lnTo>
-                  <a:pt x="7720" y="2458"/>
-                </a:lnTo>
-                <a:cubicBezTo>
-                  <a:pt x="7720" y="1103"/>
-                  <a:pt x="6617" y="1"/>
-                  <a:pt x="5294" y="1"/>
-                </a:cubicBezTo>
-                <a:close/>
-              </a:path>
-            </a:pathLst>
-          </a:custGeom>
-          <a:solidFill>
-            <a:schemeClr val="lt1"/>
-          </a:solidFill>
-          <a:ln>
-            <a:noFill/>
-          </a:ln>
-        </p:spPr>
-        <p:txBody>
-          <a:bodyPr spcFirstLastPara="1" wrap="square" lIns="91425" tIns="91425" rIns="91425" bIns="91425" anchor="ctr" anchorCtr="0">
-            <a:noAutofit/>
-          </a:bodyPr>
-          <a:lstStyle/>
-          <a:p>
-            <a:pPr marL="0" lvl="0" indent="0" algn="l" rtl="0">
-              <a:spcBef>
-                <a:spcPts val="0"/>
-              </a:spcBef>
-              <a:spcAft>
-                <a:spcPts val="0"/>
-              </a:spcAft>
-              <a:buNone/>
-            </a:pPr>
-            <a:endParaRPr/>
-          </a:p>
-        </p:txBody>
-      </p:sp>
       <p:sp>
         <p:nvSpPr>
           <p:cNvPr id="1104" name="Google Shape;1104;p50"/>
@@ -35380,6 +34496,66 @@
           </p:txBody>
         </p:sp>
       </p:grpSp>
+      <p:pic>
+        <p:nvPicPr>
+          <p:cNvPr id="13" name="Picture 12">
+            <a:extLst>
+              <a:ext uri="{FF2B5EF4-FFF2-40B4-BE49-F238E27FC236}">
+                <a16:creationId xmlns:a16="http://schemas.microsoft.com/office/drawing/2014/main" id="{C0DAFCF9-92DF-623C-1038-2617ED05ED5A}"/>
+              </a:ext>
+            </a:extLst>
+          </p:cNvPr>
+          <p:cNvPicPr>
+            <a:picLocks noChangeAspect="1"/>
+          </p:cNvPicPr>
+          <p:nvPr/>
+        </p:nvPicPr>
+        <p:blipFill>
+          <a:blip r:embed="rId3"/>
+          <a:stretch>
+            <a:fillRect/>
+          </a:stretch>
+        </p:blipFill>
+        <p:spPr>
+          <a:xfrm>
+            <a:off x="4822980" y="3680443"/>
+            <a:ext cx="477587" cy="420595"/>
+          </a:xfrm>
+          <a:prstGeom prst="rect">
+            <a:avLst/>
+          </a:prstGeom>
+        </p:spPr>
+      </p:pic>
+      <p:pic>
+        <p:nvPicPr>
+          <p:cNvPr id="15" name="Picture 14">
+            <a:extLst>
+              <a:ext uri="{FF2B5EF4-FFF2-40B4-BE49-F238E27FC236}">
+                <a16:creationId xmlns:a16="http://schemas.microsoft.com/office/drawing/2014/main" id="{E62D3A3B-6051-7450-BB40-13887FF8A519}"/>
+              </a:ext>
+            </a:extLst>
+          </p:cNvPr>
+          <p:cNvPicPr>
+            <a:picLocks noChangeAspect="1"/>
+          </p:cNvPicPr>
+          <p:nvPr/>
+        </p:nvPicPr>
+        <p:blipFill>
+          <a:blip r:embed="rId4"/>
+          <a:stretch>
+            <a:fillRect/>
+          </a:stretch>
+        </p:blipFill>
+        <p:spPr>
+          <a:xfrm>
+            <a:off x="4849403" y="2172502"/>
+            <a:ext cx="451164" cy="487855"/>
+          </a:xfrm>
+          <a:prstGeom prst="rect">
+            <a:avLst/>
+          </a:prstGeom>
+        </p:spPr>
+      </p:pic>
     </p:spTree>
   </p:cSld>
   <p:clrMapOvr>
@@ -38421,7 +37597,7 @@
             </a:pPr>
             <a:r>
               <a:rPr lang="en" dirty="0"/>
-              <a:t>— okto</a:t>
+              <a:t>— Okto</a:t>
             </a:r>
             <a:endParaRPr dirty="0"/>
           </a:p>
@@ -38445,8 +37621,8 @@
         </p:nvSpPr>
         <p:spPr>
           <a:xfrm>
-            <a:off x="1734025" y="1921313"/>
-            <a:ext cx="5675700" cy="1293000"/>
+            <a:off x="1329508" y="2105909"/>
+            <a:ext cx="6468629" cy="1293000"/>
           </a:xfrm>
           <a:prstGeom prst="rect">
             <a:avLst/>
@@ -38458,41 +37634,19 @@
           </a:bodyPr>
           <a:lstStyle/>
           <a:p>
-            <a:pPr marL="0" lvl="0" indent="0" algn="ctr" rtl="0">
-              <a:spcBef>
-                <a:spcPts val="0"/>
-              </a:spcBef>
-              <a:spcAft>
-                <a:spcPts val="0"/>
-              </a:spcAft>
-              <a:buNone/>
-            </a:pPr>
+            <a:pPr marL="0" lvl="0" indent="0"/>
             <a:r>
               <a:rPr lang="es-MX" dirty="0"/>
-              <a:t>Link al repositorio de </a:t>
-            </a:r>
-            <a:r>
-              <a:rPr lang="es-MX" dirty="0" err="1"/>
-              <a:t>github</a:t>
-            </a:r>
-            <a:r>
-              <a:rPr lang="es-MX" dirty="0"/>
-              <a:t>:</a:t>
+              <a:t>Link al repositorio de GitHub:</a:t>
             </a:r>
             <a:br>
               <a:rPr lang="es-MX" dirty="0"/>
             </a:br>
             <a:r>
-              <a:rPr lang="es-MX" dirty="0"/>
-              <a:t>(</a:t>
-            </a:r>
-            <a:r>
-              <a:rPr lang="es-MX" dirty="0" err="1"/>
-              <a:t>adrian</a:t>
-            </a:r>
-            <a:r>
-              <a:rPr lang="es-MX" dirty="0"/>
-              <a:t> aquí agrega eso)</a:t>
+              <a:rPr lang="es-MX" dirty="0">
+                <a:hlinkClick r:id="rId3"/>
+              </a:rPr>
+              <a:t>https://github.com/AdrianMtzTrev/Oktodo</a:t>
             </a:r>
             <a:endParaRPr dirty="0"/>
           </a:p>
@@ -49942,7 +49096,7 @@
               <a:buNone/>
             </a:pPr>
             <a:r>
-              <a:rPr lang="en" sz="1200">
+              <a:rPr lang="en" sz="1200" dirty="0">
                 <a:solidFill>
                   <a:schemeClr val="dk1"/>
                 </a:solidFill>
@@ -49953,7 +49107,7 @@
               </a:rPr>
               <a:t>Please keep this slide for attribution</a:t>
             </a:r>
-            <a:endParaRPr sz="1200">
+            <a:endParaRPr sz="1200" dirty="0">
               <a:solidFill>
                 <a:schemeClr val="dk1"/>
               </a:solidFill>
@@ -50668,8 +49822,8 @@
         </p:nvSpPr>
         <p:spPr>
           <a:xfrm>
-            <a:off x="2185100" y="1371150"/>
-            <a:ext cx="6001200" cy="2401200"/>
+            <a:off x="2372825" y="1291366"/>
+            <a:ext cx="5851496" cy="2360257"/>
           </a:xfrm>
           <a:prstGeom prst="rect">
             <a:avLst/>
@@ -50692,7 +49846,7 @@
             </a:pPr>
             <a:r>
               <a:rPr lang="es-MX" dirty="0"/>
-              <a:t>OKTO</a:t>
+              <a:t>OKTODO</a:t>
             </a:r>
             <a:br>
               <a:rPr lang="es-MX" dirty="0"/>
@@ -51753,8 +50907,8 @@
         </p:blipFill>
         <p:spPr bwMode="auto">
           <a:xfrm>
-            <a:off x="6567004" y="1187404"/>
-            <a:ext cx="2216096" cy="2216096"/>
+            <a:off x="6856351" y="1131395"/>
+            <a:ext cx="2051989" cy="2051989"/>
           </a:xfrm>
           <a:prstGeom prst="rect">
             <a:avLst/>
@@ -51800,8 +50954,8 @@
         </p:blipFill>
         <p:spPr bwMode="auto">
           <a:xfrm>
-            <a:off x="1317474" y="1814684"/>
-            <a:ext cx="2638353" cy="1978765"/>
+            <a:off x="1317475" y="1937400"/>
+            <a:ext cx="2474732" cy="1856049"/>
           </a:xfrm>
           <a:prstGeom prst="rect">
             <a:avLst/>
@@ -52078,7 +51232,7 @@
               <a:t>Nuestro concepto es una app que sirva para ayudar al usuario a organizar sus objetivos, metas y tareas, esto junto a </a:t>
             </a:r>
             <a:r>
-              <a:rPr lang="es-MX" dirty="0" err="1"/>
+              <a:rPr lang="es-MX" b="1" dirty="0"/>
               <a:t>Okto</a:t>
             </a:r>
             <a:r>
@@ -54149,15 +53303,7 @@
             </a:pPr>
             <a:r>
               <a:rPr lang="es-MX" dirty="0"/>
-              <a:t>El usuario puede registrar eventos </a:t>
-            </a:r>
-            <a:r>
-              <a:rPr lang="es-MX" dirty="0" err="1"/>
-              <a:t>dirarios</a:t>
-            </a:r>
-            <a:r>
-              <a:rPr lang="es-MX" dirty="0"/>
-              <a:t>, o para alguna fecha especifica</a:t>
+              <a:t>El usuario puede registrar eventos diarios, o para alguna fecha especifica</a:t>
             </a:r>
             <a:endParaRPr dirty="0"/>
           </a:p>
@@ -55117,6 +54263,9 @@
               <a:rPr lang="es-MX" dirty="0"/>
               <a:t>No tienen herramientas dinámicas para organizar objetivos grupales.</a:t>
             </a:r>
+          </a:p>
+          <a:p>
+            <a:endParaRPr lang="es-MX" dirty="0"/>
           </a:p>
           <a:p>
             <a:pPr marL="139700" indent="0">
@@ -57635,8 +56784,8 @@
         </p:nvSpPr>
         <p:spPr>
           <a:xfrm>
-            <a:off x="6135478" y="1509750"/>
-            <a:ext cx="2508658" cy="2124000"/>
+            <a:off x="6273420" y="1300484"/>
+            <a:ext cx="2557856" cy="3576316"/>
           </a:xfrm>
           <a:prstGeom prst="rect">
             <a:avLst/>
@@ -57876,7 +57025,7 @@
             </a:lvl9pPr>
           </a:lstStyle>
           <a:p>
-            <a:pPr marL="285750" indent="-285750" algn="ctr"/>
+            <a:pPr marL="285750" indent="-285750" algn="r"/>
             <a:r>
               <a:rPr lang="es-MX" sz="1600" dirty="0">
                 <a:solidFill>
@@ -57892,16 +57041,16 @@
             </a:r>
           </a:p>
           <a:p>
-            <a:pPr marL="285750" indent="-285750" algn="ctr"/>
-            <a:r>
-              <a:rPr lang="es-MX" dirty="0" err="1">
-                <a:solidFill>
-                  <a:schemeClr val="tx1"/>
-                </a:solidFill>
-                <a:latin typeface="Karla Medium" pitchFamily="2" charset="0"/>
-              </a:rPr>
-              <a:t>Tambien</a:t>
-            </a:r>
+            <a:pPr marL="285750" indent="-285750" algn="r"/>
+            <a:endParaRPr lang="es-MX" dirty="0">
+              <a:solidFill>
+                <a:schemeClr val="tx1"/>
+              </a:solidFill>
+              <a:latin typeface="Karla Medium" pitchFamily="2" charset="0"/>
+            </a:endParaRPr>
+          </a:p>
+          <a:p>
+            <a:pPr marL="285750" indent="-285750" algn="r"/>
             <a:r>
               <a:rPr lang="es-MX" dirty="0">
                 <a:solidFill>
@@ -57909,16 +57058,16 @@
                 </a:solidFill>
                 <a:latin typeface="Karla Medium" pitchFamily="2" charset="0"/>
               </a:rPr>
-              <a:t> </a:t>
+              <a:t>También </a:t>
             </a:r>
             <a:r>
-              <a:rPr lang="es-MX" dirty="0" err="1">
+              <a:rPr lang="es-MX" b="1" dirty="0">
                 <a:solidFill>
                   <a:schemeClr val="tx1"/>
                 </a:solidFill>
                 <a:latin typeface="Karla Medium" pitchFamily="2" charset="0"/>
               </a:rPr>
-              <a:t>okto</a:t>
+              <a:t>Okto</a:t>
             </a:r>
             <a:r>
               <a:rPr lang="es-MX" dirty="0">
@@ -58018,7 +57167,7 @@
         <p:spPr>
           <a:xfrm>
             <a:off x="6135478" y="1509750"/>
-            <a:ext cx="2508658" cy="2124000"/>
+            <a:ext cx="2508658" cy="2671014"/>
           </a:xfrm>
           <a:prstGeom prst="rect">
             <a:avLst/>
@@ -58258,7 +57407,7 @@
             </a:lvl9pPr>
           </a:lstStyle>
           <a:p>
-            <a:pPr marL="285750" indent="-285750" algn="ctr"/>
+            <a:pPr marL="285750" indent="-285750" algn="r"/>
             <a:r>
               <a:rPr lang="es-MX" dirty="0">
                 <a:solidFill>
@@ -58412,20 +57561,8 @@
           <a:lstStyle/>
           <a:p>
             <a:r>
-              <a:rPr lang="es-MX" dirty="0" err="1"/>
-              <a:t>Okto</a:t>
-            </a:r>
-            <a:r>
               <a:rPr lang="es-MX" dirty="0"/>
-              <a:t> </a:t>
-            </a:r>
-            <a:r>
-              <a:rPr lang="es-MX" dirty="0" err="1"/>
-              <a:t>work</a:t>
-            </a:r>
-            <a:r>
-              <a:rPr lang="es-MX" dirty="0"/>
-              <a:t> time</a:t>
+              <a:t>Okto work time</a:t>
             </a:r>
           </a:p>
         </p:txBody>
@@ -58446,8 +57583,8 @@
         </p:nvSpPr>
         <p:spPr>
           <a:xfrm>
-            <a:off x="5887844" y="1509750"/>
-            <a:ext cx="2756292" cy="2124000"/>
+            <a:off x="5887844" y="1509749"/>
+            <a:ext cx="2756292" cy="3057701"/>
           </a:xfrm>
           <a:prstGeom prst="rect">
             <a:avLst/>
@@ -58687,7 +57824,7 @@
             </a:lvl9pPr>
           </a:lstStyle>
           <a:p>
-            <a:pPr marL="285750" indent="-285750" algn="ctr"/>
+            <a:pPr marL="285750" indent="-285750" algn="r"/>
             <a:r>
               <a:rPr lang="es-MX" dirty="0">
                 <a:solidFill>
@@ -58698,13 +57835,13 @@
               <a:t>Este apartado va a ser para ayudar al usuario a concentrarse o a no usar el celular para que cumpla su meta, </a:t>
             </a:r>
             <a:r>
-              <a:rPr lang="es-MX" dirty="0" err="1">
+              <a:rPr lang="es-MX" b="1" dirty="0">
                 <a:solidFill>
                   <a:schemeClr val="tx1"/>
                 </a:solidFill>
                 <a:latin typeface="Karla Medium" pitchFamily="2" charset="0"/>
               </a:rPr>
-              <a:t>okto</a:t>
+              <a:t>Okto</a:t>
             </a:r>
             <a:r>
               <a:rPr lang="es-MX" dirty="0">

</xml_diff>